<commit_message>
Last tweeks to slides, added notes
</commit_message>
<xml_diff>
--- a/slides/Immutability.pptx
+++ b/slides/Immutability.pptx
@@ -552,8 +552,13 @@
             </a:r>
             <a:r>
               <a:rPr lang="en-US" baseline="0" dirty="0" smtClean="0"/>
-              <a:t>, etc. I wanted to present on one of the basic tenants of functional programming because I think that will help us better understand some of the functional concepts we’ve seen in those presentations.  So today I want to discuss Immutability, but not just the kind of immutability we’re already familiar with.  First, let’s quickly review what immutability is. (NEXT SLIDE)</a:t>
-            </a:r>
+              <a:t>, etc. I wanted to present on one of the basic tenants of functional programming because I think that will help us better understand some of the functional concepts we’ve seen in those presentations.  So today I want to discuss Immutability, but not just the kind of immutability we’re already familiar with.  First, let’s quickly review what immutability is. (NEXT SLIDE</a:t>
+            </a:r>
+            <a:r>
+              <a:rPr lang="en-US" baseline="0" dirty="0" smtClean="0"/>
+              <a:t>)</a:t>
+            </a:r>
+            <a:endParaRPr lang="en-US" baseline="0" dirty="0" smtClean="0"/>
           </a:p>
         </p:txBody>
       </p:sp>
@@ -864,15 +869,7 @@
             </a:r>
             <a:r>
               <a:rPr lang="en-US" baseline="0" dirty="0" smtClean="0"/>
-              <a:t>: the collection can still be added to and removed from, </a:t>
-            </a:r>
-            <a:r>
-              <a:rPr lang="en-US" baseline="0" smtClean="0"/>
-              <a:t>but doing </a:t>
-            </a:r>
-            <a:r>
-              <a:rPr lang="en-US" baseline="0" dirty="0" smtClean="0"/>
-              <a:t>so will create a new instance.  The original collection that you reference doesn’t change, and instead you’ll get back a reference to a new collection containing your changes.</a:t>
+              <a:t>: the collection can still be added to and removed from, but doing so will create a new instance.  The original collection that you reference doesn’t change, and instead you’ll get back a reference to a new collection containing your changes.</a:t>
             </a:r>
           </a:p>
           <a:p>
@@ -990,7 +987,15 @@
             </a:r>
             <a:r>
               <a:rPr lang="en-US" baseline="0" dirty="0" smtClean="0"/>
-              <a:t> get an idea of how it might work.  When I first thought about how an immutable collection might be implemented I thought about a list every time it needs to change. (DEMO </a:t>
+              <a:t> get an idea of how it might work.  When I first thought about how an immutable collection might be implemented I thought about </a:t>
+            </a:r>
+            <a:r>
+              <a:rPr lang="en-US" baseline="0" dirty="0" smtClean="0"/>
+              <a:t>copying a </a:t>
+            </a:r>
+            <a:r>
+              <a:rPr lang="en-US" baseline="0" dirty="0" smtClean="0"/>
+              <a:t>list every time it needs to change. (DEMO </a:t>
             </a:r>
             <a:r>
               <a:rPr lang="en-US" baseline="0" dirty="0" err="1" smtClean="0"/>
@@ -998,7 +1003,15 @@
             </a:r>
             <a:r>
               <a:rPr lang="en-US" baseline="0" dirty="0" smtClean="0"/>
-              <a:t>)  This is a really inefficient way to get immutability, and if we were stuck with these we’d quickly run into performance issues.  Imagine adding a lot of elements to this list, and having to clone it for every single add.  (Ask questions about the Big O of adding, removing, getting the count, and looking up the element at a specific location).</a:t>
+              <a:t>)  This is a really inefficient way to get immutability, and if we were stuck with </a:t>
+            </a:r>
+            <a:r>
+              <a:rPr lang="en-US" baseline="0" dirty="0" smtClean="0"/>
+              <a:t>this </a:t>
+            </a:r>
+            <a:r>
+              <a:rPr lang="en-US" baseline="0" dirty="0" smtClean="0"/>
+              <a:t>we’d quickly run into performance issues.  Imagine adding a lot of elements to this list, and having to clone it for every single add.  (Ask questions about the Big O of adding, removing, getting the count, and looking up the element at a specific location).</a:t>
             </a:r>
           </a:p>
           <a:p>
@@ -1230,11 +1243,7 @@
             </a:r>
             <a:r>
               <a:rPr lang="en-US" baseline="0" dirty="0" smtClean="0"/>
-              <a:t> package that contains immutable collections that follow this approach. </a:t>
-            </a:r>
-            <a:r>
-              <a:rPr lang="en-US" baseline="0" smtClean="0"/>
-              <a:t>(NEXT SLIDE)</a:t>
+              <a:t> package that contains immutable collections that follow this approach. (NEXT SLIDE)</a:t>
             </a:r>
             <a:endParaRPr lang="en-US" dirty="0"/>
           </a:p>
@@ -1458,11 +1467,38 @@
           <a:p>
             <a:r>
               <a:rPr lang="en-US" dirty="0" smtClean="0"/>
-              <a:t>- Let’s try </a:t>
-            </a:r>
+              <a:t>- As we discussed</a:t>
+            </a:r>
+            <a:r>
+              <a:rPr lang="en-US" baseline="0" dirty="0" smtClean="0"/>
+              <a:t> with the naïve example and the </a:t>
+            </a:r>
+            <a:r>
+              <a:rPr lang="en-US" baseline="0" dirty="0" err="1" smtClean="0"/>
+              <a:t>FunctionalList</a:t>
+            </a:r>
+            <a:r>
+              <a:rPr lang="en-US" baseline="0" dirty="0" smtClean="0"/>
+              <a:t>, there are performance tradeoffs when using immutable collections, and the same applies to the immutable collections library.  For example, this table shows the performance of adding to each type of collection.  This is something to consider when deciding what type of collection to use.</a:t>
+            </a:r>
+            <a:endParaRPr lang="en-US" dirty="0" smtClean="0"/>
+          </a:p>
+          <a:p>
             <a:r>
               <a:rPr lang="en-US" dirty="0" smtClean="0"/>
-              <a:t>creating an</a:t>
+              <a:t>- Now</a:t>
+            </a:r>
+            <a:r>
+              <a:rPr lang="en-US" baseline="0" dirty="0" smtClean="0"/>
+              <a:t> for an example of the immutable collections library in action, l</a:t>
+            </a:r>
+            <a:r>
+              <a:rPr lang="en-US" dirty="0" smtClean="0"/>
+              <a:t>et’s </a:t>
+            </a:r>
+            <a:r>
+              <a:rPr lang="en-US" dirty="0" smtClean="0"/>
+              <a:t>try creating an</a:t>
             </a:r>
             <a:r>
               <a:rPr lang="en-US" baseline="0" dirty="0" smtClean="0"/>
@@ -5577,6 +5613,93 @@
           </a:p>
         </p:txBody>
       </p:sp>
+      <p:sp>
+        <p:nvSpPr>
+          <p:cNvPr id="3" name="Content Placeholder 2"/>
+          <p:cNvSpPr>
+            <a:spLocks noGrp="1"/>
+          </p:cNvSpPr>
+          <p:nvPr>
+            <p:ph idx="1"/>
+          </p:nvPr>
+        </p:nvSpPr>
+        <p:spPr/>
+        <p:txBody>
+          <a:bodyPr/>
+          <a:lstStyle/>
+          <a:p>
+            <a:r>
+              <a:rPr lang="en-US" dirty="0" err="1" smtClean="0"/>
+              <a:t>SlowImmutableList</a:t>
+            </a:r>
+            <a:endParaRPr lang="en-US" dirty="0" smtClean="0"/>
+          </a:p>
+          <a:p>
+            <a:pPr lvl="1"/>
+            <a:r>
+              <a:rPr lang="en-US" dirty="0" smtClean="0"/>
+              <a:t>Add: O(n)</a:t>
+            </a:r>
+          </a:p>
+          <a:p>
+            <a:pPr lvl="1"/>
+            <a:r>
+              <a:rPr lang="en-US" dirty="0" smtClean="0"/>
+              <a:t>Remove: O(n)</a:t>
+            </a:r>
+          </a:p>
+          <a:p>
+            <a:pPr lvl="1"/>
+            <a:r>
+              <a:rPr lang="en-US" dirty="0" smtClean="0"/>
+              <a:t>Count: O(1)</a:t>
+            </a:r>
+          </a:p>
+          <a:p>
+            <a:pPr lvl="1"/>
+            <a:r>
+              <a:rPr lang="en-US" dirty="0" smtClean="0"/>
+              <a:t>Index: O(1)</a:t>
+            </a:r>
+          </a:p>
+          <a:p>
+            <a:r>
+              <a:rPr lang="en-US" dirty="0" err="1" smtClean="0"/>
+              <a:t>FunctionalList</a:t>
+            </a:r>
+            <a:endParaRPr lang="en-US" dirty="0" smtClean="0"/>
+          </a:p>
+          <a:p>
+            <a:pPr lvl="1"/>
+            <a:r>
+              <a:rPr lang="en-US" dirty="0" smtClean="0"/>
+              <a:t>Add: O(1)</a:t>
+            </a:r>
+          </a:p>
+          <a:p>
+            <a:pPr lvl="1"/>
+            <a:r>
+              <a:rPr lang="en-US" dirty="0" smtClean="0"/>
+              <a:t>Remove: O(n)</a:t>
+            </a:r>
+          </a:p>
+          <a:p>
+            <a:pPr lvl="1"/>
+            <a:r>
+              <a:rPr lang="en-US" dirty="0" smtClean="0"/>
+              <a:t>Count: O(n)</a:t>
+            </a:r>
+          </a:p>
+          <a:p>
+            <a:pPr lvl="1"/>
+            <a:r>
+              <a:rPr lang="en-US" dirty="0" smtClean="0"/>
+              <a:t>Index: O(n)</a:t>
+            </a:r>
+            <a:endParaRPr lang="en-US" dirty="0"/>
+          </a:p>
+        </p:txBody>
+      </p:sp>
     </p:spTree>
     <p:extLst>
       <p:ext uri="{BB962C8B-B14F-4D97-AF65-F5344CB8AC3E}">
@@ -5602,9 +5725,501 @@
   <p:timing>
     <p:tnLst>
       <p:par>
-        <p:cTn id="1" dur="indefinite" restart="never" nodeType="tmRoot"/>
+        <p:cTn id="1" dur="indefinite" restart="never" nodeType="tmRoot">
+          <p:childTnLst>
+            <p:seq concurrent="1" nextAc="seek">
+              <p:cTn id="2" dur="indefinite" nodeType="mainSeq">
+                <p:childTnLst>
+                  <p:par>
+                    <p:cTn id="3" fill="hold">
+                      <p:stCondLst>
+                        <p:cond delay="indefinite"/>
+                      </p:stCondLst>
+                      <p:childTnLst>
+                        <p:par>
+                          <p:cTn id="4" fill="hold">
+                            <p:stCondLst>
+                              <p:cond delay="0"/>
+                            </p:stCondLst>
+                            <p:childTnLst>
+                              <p:par>
+                                <p:cTn id="5" presetID="10" presetClass="entr" presetSubtype="0" fill="hold" grpId="0" nodeType="clickEffect">
+                                  <p:stCondLst>
+                                    <p:cond delay="0"/>
+                                  </p:stCondLst>
+                                  <p:childTnLst>
+                                    <p:set>
+                                      <p:cBhvr>
+                                        <p:cTn id="6" dur="1" fill="hold">
+                                          <p:stCondLst>
+                                            <p:cond delay="0"/>
+                                          </p:stCondLst>
+                                        </p:cTn>
+                                        <p:tgtEl>
+                                          <p:spTgt spid="3">
+                                            <p:txEl>
+                                              <p:pRg st="0" end="0"/>
+                                            </p:txEl>
+                                          </p:spTgt>
+                                        </p:tgtEl>
+                                        <p:attrNameLst>
+                                          <p:attrName>style.visibility</p:attrName>
+                                        </p:attrNameLst>
+                                      </p:cBhvr>
+                                      <p:to>
+                                        <p:strVal val="visible"/>
+                                      </p:to>
+                                    </p:set>
+                                    <p:animEffect transition="in" filter="fade">
+                                      <p:cBhvr>
+                                        <p:cTn id="7" dur="500"/>
+                                        <p:tgtEl>
+                                          <p:spTgt spid="3">
+                                            <p:txEl>
+                                              <p:pRg st="0" end="0"/>
+                                            </p:txEl>
+                                          </p:spTgt>
+                                        </p:tgtEl>
+                                      </p:cBhvr>
+                                    </p:animEffect>
+                                  </p:childTnLst>
+                                </p:cTn>
+                              </p:par>
+                              <p:par>
+                                <p:cTn id="8" presetID="10" presetClass="entr" presetSubtype="0" fill="hold" grpId="0" nodeType="withEffect">
+                                  <p:stCondLst>
+                                    <p:cond delay="0"/>
+                                  </p:stCondLst>
+                                  <p:childTnLst>
+                                    <p:set>
+                                      <p:cBhvr>
+                                        <p:cTn id="9" dur="1" fill="hold">
+                                          <p:stCondLst>
+                                            <p:cond delay="0"/>
+                                          </p:stCondLst>
+                                        </p:cTn>
+                                        <p:tgtEl>
+                                          <p:spTgt spid="3">
+                                            <p:txEl>
+                                              <p:pRg st="1" end="1"/>
+                                            </p:txEl>
+                                          </p:spTgt>
+                                        </p:tgtEl>
+                                        <p:attrNameLst>
+                                          <p:attrName>style.visibility</p:attrName>
+                                        </p:attrNameLst>
+                                      </p:cBhvr>
+                                      <p:to>
+                                        <p:strVal val="visible"/>
+                                      </p:to>
+                                    </p:set>
+                                    <p:animEffect transition="in" filter="fade">
+                                      <p:cBhvr>
+                                        <p:cTn id="10" dur="500"/>
+                                        <p:tgtEl>
+                                          <p:spTgt spid="3">
+                                            <p:txEl>
+                                              <p:pRg st="1" end="1"/>
+                                            </p:txEl>
+                                          </p:spTgt>
+                                        </p:tgtEl>
+                                      </p:cBhvr>
+                                    </p:animEffect>
+                                  </p:childTnLst>
+                                </p:cTn>
+                              </p:par>
+                              <p:par>
+                                <p:cTn id="11" presetID="10" presetClass="entr" presetSubtype="0" fill="hold" grpId="0" nodeType="withEffect">
+                                  <p:stCondLst>
+                                    <p:cond delay="0"/>
+                                  </p:stCondLst>
+                                  <p:childTnLst>
+                                    <p:set>
+                                      <p:cBhvr>
+                                        <p:cTn id="12" dur="1" fill="hold">
+                                          <p:stCondLst>
+                                            <p:cond delay="0"/>
+                                          </p:stCondLst>
+                                        </p:cTn>
+                                        <p:tgtEl>
+                                          <p:spTgt spid="3">
+                                            <p:txEl>
+                                              <p:pRg st="2" end="2"/>
+                                            </p:txEl>
+                                          </p:spTgt>
+                                        </p:tgtEl>
+                                        <p:attrNameLst>
+                                          <p:attrName>style.visibility</p:attrName>
+                                        </p:attrNameLst>
+                                      </p:cBhvr>
+                                      <p:to>
+                                        <p:strVal val="visible"/>
+                                      </p:to>
+                                    </p:set>
+                                    <p:animEffect transition="in" filter="fade">
+                                      <p:cBhvr>
+                                        <p:cTn id="13" dur="500"/>
+                                        <p:tgtEl>
+                                          <p:spTgt spid="3">
+                                            <p:txEl>
+                                              <p:pRg st="2" end="2"/>
+                                            </p:txEl>
+                                          </p:spTgt>
+                                        </p:tgtEl>
+                                      </p:cBhvr>
+                                    </p:animEffect>
+                                  </p:childTnLst>
+                                </p:cTn>
+                              </p:par>
+                              <p:par>
+                                <p:cTn id="14" presetID="10" presetClass="entr" presetSubtype="0" fill="hold" grpId="0" nodeType="withEffect">
+                                  <p:stCondLst>
+                                    <p:cond delay="0"/>
+                                  </p:stCondLst>
+                                  <p:childTnLst>
+                                    <p:set>
+                                      <p:cBhvr>
+                                        <p:cTn id="15" dur="1" fill="hold">
+                                          <p:stCondLst>
+                                            <p:cond delay="0"/>
+                                          </p:stCondLst>
+                                        </p:cTn>
+                                        <p:tgtEl>
+                                          <p:spTgt spid="3">
+                                            <p:txEl>
+                                              <p:pRg st="3" end="3"/>
+                                            </p:txEl>
+                                          </p:spTgt>
+                                        </p:tgtEl>
+                                        <p:attrNameLst>
+                                          <p:attrName>style.visibility</p:attrName>
+                                        </p:attrNameLst>
+                                      </p:cBhvr>
+                                      <p:to>
+                                        <p:strVal val="visible"/>
+                                      </p:to>
+                                    </p:set>
+                                    <p:animEffect transition="in" filter="fade">
+                                      <p:cBhvr>
+                                        <p:cTn id="16" dur="500"/>
+                                        <p:tgtEl>
+                                          <p:spTgt spid="3">
+                                            <p:txEl>
+                                              <p:pRg st="3" end="3"/>
+                                            </p:txEl>
+                                          </p:spTgt>
+                                        </p:tgtEl>
+                                      </p:cBhvr>
+                                    </p:animEffect>
+                                  </p:childTnLst>
+                                </p:cTn>
+                              </p:par>
+                              <p:par>
+                                <p:cTn id="17" presetID="10" presetClass="entr" presetSubtype="0" fill="hold" grpId="0" nodeType="withEffect">
+                                  <p:stCondLst>
+                                    <p:cond delay="0"/>
+                                  </p:stCondLst>
+                                  <p:childTnLst>
+                                    <p:set>
+                                      <p:cBhvr>
+                                        <p:cTn id="18" dur="1" fill="hold">
+                                          <p:stCondLst>
+                                            <p:cond delay="0"/>
+                                          </p:stCondLst>
+                                        </p:cTn>
+                                        <p:tgtEl>
+                                          <p:spTgt spid="3">
+                                            <p:txEl>
+                                              <p:pRg st="4" end="4"/>
+                                            </p:txEl>
+                                          </p:spTgt>
+                                        </p:tgtEl>
+                                        <p:attrNameLst>
+                                          <p:attrName>style.visibility</p:attrName>
+                                        </p:attrNameLst>
+                                      </p:cBhvr>
+                                      <p:to>
+                                        <p:strVal val="visible"/>
+                                      </p:to>
+                                    </p:set>
+                                    <p:animEffect transition="in" filter="fade">
+                                      <p:cBhvr>
+                                        <p:cTn id="19" dur="500"/>
+                                        <p:tgtEl>
+                                          <p:spTgt spid="3">
+                                            <p:txEl>
+                                              <p:pRg st="4" end="4"/>
+                                            </p:txEl>
+                                          </p:spTgt>
+                                        </p:tgtEl>
+                                      </p:cBhvr>
+                                    </p:animEffect>
+                                  </p:childTnLst>
+                                </p:cTn>
+                              </p:par>
+                            </p:childTnLst>
+                          </p:cTn>
+                        </p:par>
+                      </p:childTnLst>
+                    </p:cTn>
+                  </p:par>
+                  <p:par>
+                    <p:cTn id="20" fill="hold">
+                      <p:stCondLst>
+                        <p:cond delay="indefinite"/>
+                      </p:stCondLst>
+                      <p:childTnLst>
+                        <p:par>
+                          <p:cTn id="21" fill="hold">
+                            <p:stCondLst>
+                              <p:cond delay="0"/>
+                            </p:stCondLst>
+                            <p:childTnLst>
+                              <p:par>
+                                <p:cTn id="22" presetID="10" presetClass="entr" presetSubtype="0" fill="hold" grpId="0" nodeType="clickEffect">
+                                  <p:stCondLst>
+                                    <p:cond delay="0"/>
+                                  </p:stCondLst>
+                                  <p:childTnLst>
+                                    <p:set>
+                                      <p:cBhvr>
+                                        <p:cTn id="23" dur="1" fill="hold">
+                                          <p:stCondLst>
+                                            <p:cond delay="0"/>
+                                          </p:stCondLst>
+                                        </p:cTn>
+                                        <p:tgtEl>
+                                          <p:spTgt spid="3">
+                                            <p:txEl>
+                                              <p:pRg st="5" end="5"/>
+                                            </p:txEl>
+                                          </p:spTgt>
+                                        </p:tgtEl>
+                                        <p:attrNameLst>
+                                          <p:attrName>style.visibility</p:attrName>
+                                        </p:attrNameLst>
+                                      </p:cBhvr>
+                                      <p:to>
+                                        <p:strVal val="visible"/>
+                                      </p:to>
+                                    </p:set>
+                                    <p:animEffect transition="in" filter="fade">
+                                      <p:cBhvr>
+                                        <p:cTn id="24" dur="500"/>
+                                        <p:tgtEl>
+                                          <p:spTgt spid="3">
+                                            <p:txEl>
+                                              <p:pRg st="5" end="5"/>
+                                            </p:txEl>
+                                          </p:spTgt>
+                                        </p:tgtEl>
+                                      </p:cBhvr>
+                                    </p:animEffect>
+                                  </p:childTnLst>
+                                </p:cTn>
+                              </p:par>
+                              <p:par>
+                                <p:cTn id="25" presetID="10" presetClass="entr" presetSubtype="0" fill="hold" grpId="0" nodeType="withEffect">
+                                  <p:stCondLst>
+                                    <p:cond delay="0"/>
+                                  </p:stCondLst>
+                                  <p:childTnLst>
+                                    <p:set>
+                                      <p:cBhvr>
+                                        <p:cTn id="26" dur="1" fill="hold">
+                                          <p:stCondLst>
+                                            <p:cond delay="0"/>
+                                          </p:stCondLst>
+                                        </p:cTn>
+                                        <p:tgtEl>
+                                          <p:spTgt spid="3">
+                                            <p:txEl>
+                                              <p:pRg st="6" end="6"/>
+                                            </p:txEl>
+                                          </p:spTgt>
+                                        </p:tgtEl>
+                                        <p:attrNameLst>
+                                          <p:attrName>style.visibility</p:attrName>
+                                        </p:attrNameLst>
+                                      </p:cBhvr>
+                                      <p:to>
+                                        <p:strVal val="visible"/>
+                                      </p:to>
+                                    </p:set>
+                                    <p:animEffect transition="in" filter="fade">
+                                      <p:cBhvr>
+                                        <p:cTn id="27" dur="500"/>
+                                        <p:tgtEl>
+                                          <p:spTgt spid="3">
+                                            <p:txEl>
+                                              <p:pRg st="6" end="6"/>
+                                            </p:txEl>
+                                          </p:spTgt>
+                                        </p:tgtEl>
+                                      </p:cBhvr>
+                                    </p:animEffect>
+                                  </p:childTnLst>
+                                </p:cTn>
+                              </p:par>
+                              <p:par>
+                                <p:cTn id="28" presetID="10" presetClass="entr" presetSubtype="0" fill="hold" grpId="0" nodeType="withEffect">
+                                  <p:stCondLst>
+                                    <p:cond delay="0"/>
+                                  </p:stCondLst>
+                                  <p:childTnLst>
+                                    <p:set>
+                                      <p:cBhvr>
+                                        <p:cTn id="29" dur="1" fill="hold">
+                                          <p:stCondLst>
+                                            <p:cond delay="0"/>
+                                          </p:stCondLst>
+                                        </p:cTn>
+                                        <p:tgtEl>
+                                          <p:spTgt spid="3">
+                                            <p:txEl>
+                                              <p:pRg st="7" end="7"/>
+                                            </p:txEl>
+                                          </p:spTgt>
+                                        </p:tgtEl>
+                                        <p:attrNameLst>
+                                          <p:attrName>style.visibility</p:attrName>
+                                        </p:attrNameLst>
+                                      </p:cBhvr>
+                                      <p:to>
+                                        <p:strVal val="visible"/>
+                                      </p:to>
+                                    </p:set>
+                                    <p:animEffect transition="in" filter="fade">
+                                      <p:cBhvr>
+                                        <p:cTn id="30" dur="500"/>
+                                        <p:tgtEl>
+                                          <p:spTgt spid="3">
+                                            <p:txEl>
+                                              <p:pRg st="7" end="7"/>
+                                            </p:txEl>
+                                          </p:spTgt>
+                                        </p:tgtEl>
+                                      </p:cBhvr>
+                                    </p:animEffect>
+                                  </p:childTnLst>
+                                </p:cTn>
+                              </p:par>
+                              <p:par>
+                                <p:cTn id="31" presetID="10" presetClass="entr" presetSubtype="0" fill="hold" grpId="0" nodeType="withEffect">
+                                  <p:stCondLst>
+                                    <p:cond delay="0"/>
+                                  </p:stCondLst>
+                                  <p:childTnLst>
+                                    <p:set>
+                                      <p:cBhvr>
+                                        <p:cTn id="32" dur="1" fill="hold">
+                                          <p:stCondLst>
+                                            <p:cond delay="0"/>
+                                          </p:stCondLst>
+                                        </p:cTn>
+                                        <p:tgtEl>
+                                          <p:spTgt spid="3">
+                                            <p:txEl>
+                                              <p:pRg st="8" end="8"/>
+                                            </p:txEl>
+                                          </p:spTgt>
+                                        </p:tgtEl>
+                                        <p:attrNameLst>
+                                          <p:attrName>style.visibility</p:attrName>
+                                        </p:attrNameLst>
+                                      </p:cBhvr>
+                                      <p:to>
+                                        <p:strVal val="visible"/>
+                                      </p:to>
+                                    </p:set>
+                                    <p:animEffect transition="in" filter="fade">
+                                      <p:cBhvr>
+                                        <p:cTn id="33" dur="500"/>
+                                        <p:tgtEl>
+                                          <p:spTgt spid="3">
+                                            <p:txEl>
+                                              <p:pRg st="8" end="8"/>
+                                            </p:txEl>
+                                          </p:spTgt>
+                                        </p:tgtEl>
+                                      </p:cBhvr>
+                                    </p:animEffect>
+                                  </p:childTnLst>
+                                </p:cTn>
+                              </p:par>
+                              <p:par>
+                                <p:cTn id="34" presetID="10" presetClass="entr" presetSubtype="0" fill="hold" grpId="0" nodeType="withEffect">
+                                  <p:stCondLst>
+                                    <p:cond delay="0"/>
+                                  </p:stCondLst>
+                                  <p:childTnLst>
+                                    <p:set>
+                                      <p:cBhvr>
+                                        <p:cTn id="35" dur="1" fill="hold">
+                                          <p:stCondLst>
+                                            <p:cond delay="0"/>
+                                          </p:stCondLst>
+                                        </p:cTn>
+                                        <p:tgtEl>
+                                          <p:spTgt spid="3">
+                                            <p:txEl>
+                                              <p:pRg st="9" end="9"/>
+                                            </p:txEl>
+                                          </p:spTgt>
+                                        </p:tgtEl>
+                                        <p:attrNameLst>
+                                          <p:attrName>style.visibility</p:attrName>
+                                        </p:attrNameLst>
+                                      </p:cBhvr>
+                                      <p:to>
+                                        <p:strVal val="visible"/>
+                                      </p:to>
+                                    </p:set>
+                                    <p:animEffect transition="in" filter="fade">
+                                      <p:cBhvr>
+                                        <p:cTn id="36" dur="500"/>
+                                        <p:tgtEl>
+                                          <p:spTgt spid="3">
+                                            <p:txEl>
+                                              <p:pRg st="9" end="9"/>
+                                            </p:txEl>
+                                          </p:spTgt>
+                                        </p:tgtEl>
+                                      </p:cBhvr>
+                                    </p:animEffect>
+                                  </p:childTnLst>
+                                </p:cTn>
+                              </p:par>
+                            </p:childTnLst>
+                          </p:cTn>
+                        </p:par>
+                      </p:childTnLst>
+                    </p:cTn>
+                  </p:par>
+                </p:childTnLst>
+              </p:cTn>
+              <p:prevCondLst>
+                <p:cond evt="onPrev" delay="0">
+                  <p:tgtEl>
+                    <p:sldTgt/>
+                  </p:tgtEl>
+                </p:cond>
+              </p:prevCondLst>
+              <p:nextCondLst>
+                <p:cond evt="onNext" delay="0">
+                  <p:tgtEl>
+                    <p:sldTgt/>
+                  </p:tgtEl>
+                </p:cond>
+              </p:nextCondLst>
+            </p:seq>
+          </p:childTnLst>
+        </p:cTn>
       </p:par>
     </p:tnLst>
+    <p:bldLst>
+      <p:bldP spid="3" grpId="0" build="p"/>
+    </p:bldLst>
   </p:timing>
 </p:sld>
 </file>

</xml_diff>